<commit_message>
Implements compound operator (union, intersect, except) on select expressions. Allows executeSelectPage on select with group by
</commit_message>
<xml_diff>
--- a/doc/select.pptx
+++ b/doc/select.pptx
@@ -255,7 +255,7 @@
           <a:p>
             <a:fld id="{064700E2-490F-4419-AC2C-49136718AF20}" type="datetimeFigureOut">
               <a:rPr lang="es-ES" smtClean="0"/>
-              <a:t>17/08/2019</a:t>
+              <a:t>20/5/21</a:t>
             </a:fld>
             <a:endParaRPr lang="es-ES"/>
           </a:p>
@@ -425,7 +425,7 @@
           <a:p>
             <a:fld id="{064700E2-490F-4419-AC2C-49136718AF20}" type="datetimeFigureOut">
               <a:rPr lang="es-ES" smtClean="0"/>
-              <a:t>17/08/2019</a:t>
+              <a:t>20/5/21</a:t>
             </a:fld>
             <a:endParaRPr lang="es-ES"/>
           </a:p>
@@ -605,7 +605,7 @@
           <a:p>
             <a:fld id="{064700E2-490F-4419-AC2C-49136718AF20}" type="datetimeFigureOut">
               <a:rPr lang="es-ES" smtClean="0"/>
-              <a:t>17/08/2019</a:t>
+              <a:t>20/5/21</a:t>
             </a:fld>
             <a:endParaRPr lang="es-ES"/>
           </a:p>
@@ -775,7 +775,7 @@
           <a:p>
             <a:fld id="{064700E2-490F-4419-AC2C-49136718AF20}" type="datetimeFigureOut">
               <a:rPr lang="es-ES" smtClean="0"/>
-              <a:t>17/08/2019</a:t>
+              <a:t>20/5/21</a:t>
             </a:fld>
             <a:endParaRPr lang="es-ES"/>
           </a:p>
@@ -1021,7 +1021,7 @@
           <a:p>
             <a:fld id="{064700E2-490F-4419-AC2C-49136718AF20}" type="datetimeFigureOut">
               <a:rPr lang="es-ES" smtClean="0"/>
-              <a:t>17/08/2019</a:t>
+              <a:t>20/5/21</a:t>
             </a:fld>
             <a:endParaRPr lang="es-ES"/>
           </a:p>
@@ -1253,7 +1253,7 @@
           <a:p>
             <a:fld id="{064700E2-490F-4419-AC2C-49136718AF20}" type="datetimeFigureOut">
               <a:rPr lang="es-ES" smtClean="0"/>
-              <a:t>17/08/2019</a:t>
+              <a:t>20/5/21</a:t>
             </a:fld>
             <a:endParaRPr lang="es-ES"/>
           </a:p>
@@ -1620,7 +1620,7 @@
           <a:p>
             <a:fld id="{064700E2-490F-4419-AC2C-49136718AF20}" type="datetimeFigureOut">
               <a:rPr lang="es-ES" smtClean="0"/>
-              <a:t>17/08/2019</a:t>
+              <a:t>20/5/21</a:t>
             </a:fld>
             <a:endParaRPr lang="es-ES"/>
           </a:p>
@@ -1738,7 +1738,7 @@
           <a:p>
             <a:fld id="{064700E2-490F-4419-AC2C-49136718AF20}" type="datetimeFigureOut">
               <a:rPr lang="es-ES" smtClean="0"/>
-              <a:t>17/08/2019</a:t>
+              <a:t>20/5/21</a:t>
             </a:fld>
             <a:endParaRPr lang="es-ES"/>
           </a:p>
@@ -1833,7 +1833,7 @@
           <a:p>
             <a:fld id="{064700E2-490F-4419-AC2C-49136718AF20}" type="datetimeFigureOut">
               <a:rPr lang="es-ES" smtClean="0"/>
-              <a:t>17/08/2019</a:t>
+              <a:t>20/5/21</a:t>
             </a:fld>
             <a:endParaRPr lang="es-ES"/>
           </a:p>
@@ -2110,7 +2110,7 @@
           <a:p>
             <a:fld id="{064700E2-490F-4419-AC2C-49136718AF20}" type="datetimeFigureOut">
               <a:rPr lang="es-ES" smtClean="0"/>
-              <a:t>17/08/2019</a:t>
+              <a:t>20/5/21</a:t>
             </a:fld>
             <a:endParaRPr lang="es-ES"/>
           </a:p>
@@ -2367,7 +2367,7 @@
           <a:p>
             <a:fld id="{064700E2-490F-4419-AC2C-49136718AF20}" type="datetimeFigureOut">
               <a:rPr lang="es-ES" smtClean="0"/>
-              <a:t>17/08/2019</a:t>
+              <a:t>20/5/21</a:t>
             </a:fld>
             <a:endParaRPr lang="es-ES"/>
           </a:p>
@@ -2580,7 +2580,7 @@
           <a:p>
             <a:fld id="{064700E2-490F-4419-AC2C-49136718AF20}" type="datetimeFigureOut">
               <a:rPr lang="es-ES" smtClean="0"/>
-              <a:t>17/08/2019</a:t>
+              <a:t>20/5/21</a:t>
             </a:fld>
             <a:endParaRPr lang="es-ES"/>
           </a:p>
@@ -2999,7 +2999,7 @@
         </p:nvSpPr>
         <p:spPr>
           <a:xfrm>
-            <a:off x="3825622" y="7124821"/>
+            <a:off x="3825622" y="7912221"/>
             <a:ext cx="1056700" cy="246221"/>
           </a:xfrm>
           <a:prstGeom prst="rect">
@@ -3035,7 +3035,7 @@
         </p:nvSpPr>
         <p:spPr>
           <a:xfrm>
-            <a:off x="4814499" y="7493121"/>
+            <a:off x="4814499" y="8280521"/>
             <a:ext cx="1693092" cy="246221"/>
           </a:xfrm>
           <a:prstGeom prst="rect">
@@ -3075,7 +3075,7 @@
         </p:nvCxnSpPr>
         <p:spPr>
           <a:xfrm>
-            <a:off x="4353973" y="7371041"/>
+            <a:off x="4353973" y="8158441"/>
             <a:ext cx="460527" cy="245190"/>
           </a:xfrm>
           <a:prstGeom prst="straightConnector1">
@@ -3114,7 +3114,7 @@
         </p:nvSpPr>
         <p:spPr>
           <a:xfrm>
-            <a:off x="937376" y="6934321"/>
+            <a:off x="937376" y="7721721"/>
             <a:ext cx="947695" cy="246221"/>
           </a:xfrm>
           <a:prstGeom prst="rect">
@@ -3150,7 +3150,7 @@
         </p:nvSpPr>
         <p:spPr>
           <a:xfrm>
-            <a:off x="5810820" y="6044544"/>
+            <a:off x="5810820" y="6831944"/>
             <a:ext cx="2411238" cy="246221"/>
           </a:xfrm>
           <a:prstGeom prst="rect">
@@ -3186,7 +3186,7 @@
         </p:nvSpPr>
         <p:spPr>
           <a:xfrm>
-            <a:off x="4596407" y="7386840"/>
+            <a:off x="4596407" y="8174240"/>
             <a:ext cx="336952" cy="184666"/>
           </a:xfrm>
           <a:prstGeom prst="rect">
@@ -3222,7 +3222,7 @@
         </p:nvSpPr>
         <p:spPr>
           <a:xfrm>
-            <a:off x="1813926" y="6360364"/>
+            <a:off x="1813926" y="7147764"/>
             <a:ext cx="377026" cy="184666"/>
           </a:xfrm>
           <a:prstGeom prst="rect">
@@ -3270,7 +3270,7 @@
         </p:nvCxnSpPr>
         <p:spPr>
           <a:xfrm rot="16200000" flipH="1">
-            <a:off x="4271380" y="4628214"/>
+            <a:off x="4271380" y="5415614"/>
             <a:ext cx="1431532" cy="1647348"/>
           </a:xfrm>
           <a:prstGeom prst="curvedConnector2">
@@ -3309,7 +3309,7 @@
         </p:nvSpPr>
         <p:spPr>
           <a:xfrm>
-            <a:off x="4788155" y="5687887"/>
+            <a:off x="4788155" y="6475287"/>
             <a:ext cx="405880" cy="184666"/>
           </a:xfrm>
           <a:prstGeom prst="rect">
@@ -3349,7 +3349,7 @@
         </p:nvSpPr>
         <p:spPr>
           <a:xfrm>
-            <a:off x="4624000" y="5058629"/>
+            <a:off x="4624000" y="5846029"/>
             <a:ext cx="2328067" cy="246221"/>
           </a:xfrm>
           <a:prstGeom prst="rect">
@@ -3389,7 +3389,7 @@
         </p:nvCxnSpPr>
         <p:spPr>
           <a:xfrm>
-            <a:off x="4163472" y="4736123"/>
+            <a:off x="4163472" y="5523523"/>
             <a:ext cx="460528" cy="445617"/>
           </a:xfrm>
           <a:prstGeom prst="straightConnector1">
@@ -3428,7 +3428,7 @@
         </p:nvSpPr>
         <p:spPr>
           <a:xfrm>
-            <a:off x="4382308" y="4859002"/>
+            <a:off x="4382308" y="5646402"/>
             <a:ext cx="421910" cy="184666"/>
           </a:xfrm>
           <a:prstGeom prst="rect">
@@ -3472,7 +3472,7 @@
         </p:nvCxnSpPr>
         <p:spPr>
           <a:xfrm flipH="1">
-            <a:off x="5661045" y="7616231"/>
+            <a:off x="5661045" y="8403631"/>
             <a:ext cx="846546" cy="123110"/>
           </a:xfrm>
           <a:prstGeom prst="bentConnector4">
@@ -3514,7 +3514,7 @@
         </p:nvSpPr>
         <p:spPr>
           <a:xfrm>
-            <a:off x="6062747" y="7828800"/>
+            <a:off x="6062747" y="8616200"/>
             <a:ext cx="336952" cy="184666"/>
           </a:xfrm>
           <a:prstGeom prst="rect">
@@ -3550,8 +3550,8 @@
         </p:nvSpPr>
         <p:spPr>
           <a:xfrm>
-            <a:off x="7689766" y="1995072"/>
-            <a:ext cx="2060179" cy="246221"/>
+            <a:off x="7508626" y="2782472"/>
+            <a:ext cx="2422459" cy="246221"/>
           </a:xfrm>
           <a:prstGeom prst="rect">
             <a:avLst/>
@@ -3567,7 +3567,7 @@
             <a:pPr algn="ctr"/>
             <a:r>
               <a:rPr lang="es-ES_tradnl" sz="1000" dirty="0" err="1"/>
-              <a:t>OrderByExecutableSelectExpression</a:t>
+              <a:t>CompoundableExecutableSelectExpression</a:t>
             </a:r>
             <a:endParaRPr lang="es-ES_tradnl" sz="1000" dirty="0"/>
           </a:p>
@@ -3587,7 +3587,7 @@
         </p:nvSpPr>
         <p:spPr>
           <a:xfrm>
-            <a:off x="9102350" y="6044544"/>
+            <a:off x="9102350" y="6831944"/>
             <a:ext cx="2430474" cy="246221"/>
           </a:xfrm>
           <a:prstGeom prst="rect">
@@ -3627,7 +3627,7 @@
         </p:nvCxnSpPr>
         <p:spPr>
           <a:xfrm>
-            <a:off x="8222058" y="6167654"/>
+            <a:off x="8222058" y="6955054"/>
             <a:ext cx="880292" cy="0"/>
           </a:xfrm>
           <a:prstGeom prst="straightConnector1">
@@ -3666,7 +3666,7 @@
         </p:nvSpPr>
         <p:spPr>
           <a:xfrm>
-            <a:off x="10850312" y="6360364"/>
+            <a:off x="10850312" y="7147764"/>
             <a:ext cx="404278" cy="184666"/>
           </a:xfrm>
           <a:prstGeom prst="rect">
@@ -3702,7 +3702,7 @@
         </p:nvSpPr>
         <p:spPr>
           <a:xfrm>
-            <a:off x="7951582" y="1585269"/>
+            <a:off x="7951582" y="1267769"/>
             <a:ext cx="473206" cy="184666"/>
           </a:xfrm>
           <a:prstGeom prst="rect">
@@ -3742,7 +3742,7 @@
         </p:nvSpPr>
         <p:spPr>
           <a:xfrm>
-            <a:off x="9444243" y="1076684"/>
+            <a:off x="9444243" y="759184"/>
             <a:ext cx="1067921" cy="246221"/>
           </a:xfrm>
           <a:prstGeom prst="rect">
@@ -3778,7 +3778,7 @@
         </p:nvSpPr>
         <p:spPr>
           <a:xfrm>
-            <a:off x="11897433" y="1076683"/>
+            <a:off x="11897433" y="759183"/>
             <a:ext cx="266700" cy="246221"/>
           </a:xfrm>
           <a:prstGeom prst="ellipse">
@@ -3831,7 +3831,7 @@
         </p:nvCxnSpPr>
         <p:spPr>
           <a:xfrm flipV="1">
-            <a:off x="10512163" y="1199794"/>
+            <a:off x="10512163" y="882294"/>
             <a:ext cx="1385270" cy="1"/>
           </a:xfrm>
           <a:prstGeom prst="straightConnector1">
@@ -3870,7 +3870,7 @@
         </p:nvSpPr>
         <p:spPr>
           <a:xfrm>
-            <a:off x="10086712" y="1995072"/>
+            <a:off x="10086712" y="1677572"/>
             <a:ext cx="1944763" cy="246221"/>
           </a:xfrm>
           <a:prstGeom prst="rect">
@@ -3903,14 +3903,13 @@
           </p:cNvPr>
           <p:cNvCxnSpPr>
             <a:cxnSpLocks/>
-            <a:stCxn id="47" idx="3"/>
             <a:endCxn id="72" idx="1"/>
           </p:cNvCxnSpPr>
           <p:nvPr/>
         </p:nvCxnSpPr>
         <p:spPr>
           <a:xfrm>
-            <a:off x="9749945" y="2118183"/>
+            <a:off x="9749945" y="1800683"/>
             <a:ext cx="336767" cy="0"/>
           </a:xfrm>
           <a:prstGeom prst="straightConnector1">
@@ -3949,7 +3948,7 @@
         </p:nvSpPr>
         <p:spPr>
           <a:xfrm>
-            <a:off x="9745598" y="1943591"/>
+            <a:off x="9745598" y="1626091"/>
             <a:ext cx="324128" cy="184666"/>
           </a:xfrm>
           <a:prstGeom prst="rect">
@@ -3989,7 +3988,7 @@
         </p:nvCxnSpPr>
         <p:spPr>
           <a:xfrm flipH="1" flipV="1">
-            <a:off x="9978204" y="1322905"/>
+            <a:off x="9978204" y="1005405"/>
             <a:ext cx="1080890" cy="672167"/>
           </a:xfrm>
           <a:prstGeom prst="straightConnector1">
@@ -4028,7 +4027,7 @@
         </p:nvSpPr>
         <p:spPr>
           <a:xfrm>
-            <a:off x="10653927" y="1582848"/>
+            <a:off x="10653927" y="1265348"/>
             <a:ext cx="367408" cy="184666"/>
           </a:xfrm>
           <a:prstGeom prst="rect">
@@ -4068,7 +4067,7 @@
         </p:nvCxnSpPr>
         <p:spPr>
           <a:xfrm flipH="1">
-            <a:off x="5788034" y="5181740"/>
+            <a:off x="5788034" y="5969140"/>
             <a:ext cx="1164033" cy="123110"/>
           </a:xfrm>
           <a:prstGeom prst="bentConnector4">
@@ -4110,7 +4109,7 @@
         </p:nvSpPr>
         <p:spPr>
           <a:xfrm>
-            <a:off x="6110945" y="5377926"/>
+            <a:off x="6110945" y="6165326"/>
             <a:ext cx="404278" cy="184666"/>
           </a:xfrm>
           <a:prstGeom prst="rect">
@@ -4150,7 +4149,7 @@
         </p:nvCxnSpPr>
         <p:spPr>
           <a:xfrm>
-            <a:off x="6952067" y="5181740"/>
+            <a:off x="6952067" y="5969140"/>
             <a:ext cx="546292" cy="1341"/>
           </a:xfrm>
           <a:prstGeom prst="straightConnector1">
@@ -4189,7 +4188,7 @@
         </p:nvSpPr>
         <p:spPr>
           <a:xfrm>
-            <a:off x="10529406" y="1024907"/>
+            <a:off x="10529406" y="707407"/>
             <a:ext cx="470000" cy="184666"/>
           </a:xfrm>
           <a:prstGeom prst="rect">
@@ -4229,7 +4228,7 @@
         </p:nvSpPr>
         <p:spPr>
           <a:xfrm>
-            <a:off x="7043925" y="5029192"/>
+            <a:off x="7043925" y="5816592"/>
             <a:ext cx="405880" cy="184666"/>
           </a:xfrm>
           <a:prstGeom prst="rect">
@@ -4269,7 +4268,7 @@
         </p:nvSpPr>
         <p:spPr>
           <a:xfrm>
-            <a:off x="720212" y="7674913"/>
+            <a:off x="720212" y="8462313"/>
             <a:ext cx="1373729" cy="246221"/>
           </a:xfrm>
           <a:prstGeom prst="rect">
@@ -4305,7 +4304,7 @@
         </p:nvSpPr>
         <p:spPr>
           <a:xfrm>
-            <a:off x="1140111" y="7339014"/>
+            <a:off x="1140111" y="8126414"/>
             <a:ext cx="303288" cy="184666"/>
           </a:xfrm>
           <a:prstGeom prst="rect">
@@ -4349,7 +4348,7 @@
         </p:nvCxnSpPr>
         <p:spPr>
           <a:xfrm rot="10800000" flipH="1" flipV="1">
-            <a:off x="720211" y="7798023"/>
+            <a:off x="720211" y="8585423"/>
             <a:ext cx="686865" cy="123110"/>
           </a:xfrm>
           <a:prstGeom prst="bentConnector4">
@@ -4391,7 +4390,7 @@
         </p:nvSpPr>
         <p:spPr>
           <a:xfrm>
-            <a:off x="735833" y="7951911"/>
+            <a:off x="735833" y="8739311"/>
             <a:ext cx="404278" cy="184666"/>
           </a:xfrm>
           <a:prstGeom prst="rect">
@@ -4427,7 +4426,7 @@
         </p:nvSpPr>
         <p:spPr>
           <a:xfrm>
-            <a:off x="3457990" y="4489902"/>
+            <a:off x="3457990" y="5277302"/>
             <a:ext cx="1410964" cy="246221"/>
           </a:xfrm>
           <a:prstGeom prst="rect">
@@ -4463,7 +4462,7 @@
         </p:nvSpPr>
         <p:spPr>
           <a:xfrm>
-            <a:off x="2933738" y="6290710"/>
+            <a:off x="2933738" y="7078110"/>
             <a:ext cx="1616148" cy="246221"/>
           </a:xfrm>
           <a:prstGeom prst="rect">
@@ -4503,7 +4502,7 @@
         </p:nvCxnSpPr>
         <p:spPr>
           <a:xfrm rot="10800000" flipV="1">
-            <a:off x="1411225" y="6413820"/>
+            <a:off x="1411225" y="7201220"/>
             <a:ext cx="1522515" cy="520500"/>
           </a:xfrm>
           <a:prstGeom prst="curvedConnector2">
@@ -4545,7 +4544,7 @@
         </p:nvCxnSpPr>
         <p:spPr>
           <a:xfrm flipH="1">
-            <a:off x="1407077" y="7180542"/>
+            <a:off x="1407077" y="7967942"/>
             <a:ext cx="4147" cy="494371"/>
           </a:xfrm>
           <a:prstGeom prst="straightConnector1">
@@ -4587,7 +4586,7 @@
         </p:nvCxnSpPr>
         <p:spPr>
           <a:xfrm>
-            <a:off x="3736322" y="4705053"/>
+            <a:off x="3736322" y="5492453"/>
             <a:ext cx="5490" cy="1585657"/>
           </a:xfrm>
           <a:prstGeom prst="straightConnector1">
@@ -4631,7 +4630,7 @@
         </p:nvCxnSpPr>
         <p:spPr>
           <a:xfrm flipH="1">
-            <a:off x="7016439" y="5306191"/>
+            <a:off x="7016439" y="6093591"/>
             <a:ext cx="1739637" cy="738353"/>
           </a:xfrm>
           <a:prstGeom prst="straightConnector1">
@@ -4674,7 +4673,7 @@
         </p:nvCxnSpPr>
         <p:spPr>
           <a:xfrm>
-            <a:off x="8756076" y="5306191"/>
+            <a:off x="8756076" y="6093591"/>
             <a:ext cx="1561511" cy="738353"/>
           </a:xfrm>
           <a:prstGeom prst="straightConnector1">
@@ -4715,7 +4714,7 @@
         </p:nvCxnSpPr>
         <p:spPr>
           <a:xfrm flipH="1">
-            <a:off x="9056623" y="1337211"/>
+            <a:off x="9056623" y="1019711"/>
             <a:ext cx="670689" cy="653844"/>
           </a:xfrm>
           <a:prstGeom prst="straightConnector1">
@@ -4754,7 +4753,7 @@
         </p:nvCxnSpPr>
         <p:spPr>
           <a:xfrm>
-            <a:off x="9727312" y="1337211"/>
+            <a:off x="9727312" y="1019711"/>
             <a:ext cx="802095" cy="606380"/>
           </a:xfrm>
           <a:prstGeom prst="straightConnector1">
@@ -4796,7 +4795,7 @@
         </p:nvCxnSpPr>
         <p:spPr>
           <a:xfrm flipH="1">
-            <a:off x="1885070" y="6536931"/>
+            <a:off x="1885070" y="7324331"/>
             <a:ext cx="1856742" cy="520501"/>
           </a:xfrm>
           <a:prstGeom prst="straightConnector1">
@@ -4838,7 +4837,7 @@
         </p:nvCxnSpPr>
         <p:spPr>
           <a:xfrm flipH="1">
-            <a:off x="2093940" y="6536931"/>
+            <a:off x="2093940" y="7324331"/>
             <a:ext cx="1647872" cy="1261093"/>
           </a:xfrm>
           <a:prstGeom prst="straightConnector1">
@@ -4880,7 +4879,7 @@
         </p:nvCxnSpPr>
         <p:spPr>
           <a:xfrm flipV="1">
-            <a:off x="2896523" y="7247932"/>
+            <a:off x="2896523" y="8035332"/>
             <a:ext cx="929099" cy="711000"/>
           </a:xfrm>
           <a:prstGeom prst="straightConnector1">
@@ -4919,7 +4918,7 @@
         </p:nvSpPr>
         <p:spPr>
           <a:xfrm>
-            <a:off x="2845079" y="7481197"/>
+            <a:off x="2845079" y="8268597"/>
             <a:ext cx="558166" cy="276999"/>
           </a:xfrm>
           <a:prstGeom prst="rect">
@@ -4969,7 +4968,7 @@
         </p:nvCxnSpPr>
         <p:spPr>
           <a:xfrm>
-            <a:off x="3741812" y="6536930"/>
+            <a:off x="3741812" y="7324330"/>
             <a:ext cx="612160" cy="587890"/>
           </a:xfrm>
           <a:prstGeom prst="straightConnector1">
@@ -5010,7 +5009,7 @@
         </p:nvCxnSpPr>
         <p:spPr>
           <a:xfrm>
-            <a:off x="3736322" y="4719928"/>
+            <a:off x="3736322" y="5507328"/>
             <a:ext cx="1560666" cy="2851579"/>
           </a:xfrm>
           <a:prstGeom prst="straightConnector1">
@@ -5049,7 +5048,7 @@
         </p:nvSpPr>
         <p:spPr>
           <a:xfrm>
-            <a:off x="2775965" y="8434852"/>
+            <a:off x="2775965" y="9222252"/>
             <a:ext cx="1552028" cy="246221"/>
           </a:xfrm>
           <a:prstGeom prst="rect">
@@ -5088,7 +5087,7 @@
         </p:nvCxnSpPr>
         <p:spPr>
           <a:xfrm flipV="1">
-            <a:off x="3551980" y="7247931"/>
+            <a:off x="3551980" y="8035331"/>
             <a:ext cx="273643" cy="1186920"/>
           </a:xfrm>
           <a:prstGeom prst="straightConnector1">
@@ -5127,7 +5126,7 @@
         </p:nvSpPr>
         <p:spPr>
           <a:xfrm>
-            <a:off x="3289514" y="8123765"/>
+            <a:off x="3289514" y="8911165"/>
             <a:ext cx="336952" cy="184666"/>
           </a:xfrm>
           <a:prstGeom prst="rect">
@@ -5165,7 +5164,7 @@
         </p:nvCxnSpPr>
         <p:spPr>
           <a:xfrm>
-            <a:off x="1407075" y="8557962"/>
+            <a:off x="1407075" y="9345362"/>
             <a:ext cx="1368890" cy="1"/>
           </a:xfrm>
           <a:prstGeom prst="straightConnector1">
@@ -5204,7 +5203,7 @@
         </p:nvSpPr>
         <p:spPr>
           <a:xfrm>
-            <a:off x="1937685" y="8375606"/>
+            <a:off x="1937685" y="9163006"/>
             <a:ext cx="657552" cy="184666"/>
           </a:xfrm>
           <a:prstGeom prst="rect">
@@ -5240,7 +5239,7 @@
         </p:nvSpPr>
         <p:spPr>
           <a:xfrm>
-            <a:off x="7004151" y="526755"/>
+            <a:off x="7004151" y="209255"/>
             <a:ext cx="1765227" cy="246221"/>
           </a:xfrm>
           <a:prstGeom prst="rect">
@@ -5279,7 +5278,7 @@
         </p:nvCxnSpPr>
         <p:spPr>
           <a:xfrm>
-            <a:off x="8769378" y="649866"/>
+            <a:off x="8769378" y="332366"/>
             <a:ext cx="674865" cy="549929"/>
           </a:xfrm>
           <a:prstGeom prst="straightConnector1">
@@ -5318,7 +5317,7 @@
         </p:nvSpPr>
         <p:spPr>
           <a:xfrm>
-            <a:off x="9056538" y="781390"/>
+            <a:off x="9056538" y="463890"/>
             <a:ext cx="405880" cy="184666"/>
           </a:xfrm>
           <a:prstGeom prst="rect">
@@ -5360,7 +5359,7 @@
         </p:nvCxnSpPr>
         <p:spPr>
           <a:xfrm>
-            <a:off x="5810820" y="649865"/>
+            <a:off x="5810820" y="332365"/>
             <a:ext cx="1193330" cy="1"/>
           </a:xfrm>
           <a:prstGeom prst="straightConnector1">
@@ -5399,7 +5398,7 @@
         </p:nvSpPr>
         <p:spPr>
           <a:xfrm>
-            <a:off x="5994362" y="457718"/>
+            <a:off x="5994362" y="140218"/>
             <a:ext cx="790601" cy="184666"/>
           </a:xfrm>
           <a:prstGeom prst="rect">
@@ -5435,7 +5434,7 @@
         </p:nvSpPr>
         <p:spPr>
           <a:xfrm>
-            <a:off x="8398538" y="6005177"/>
+            <a:off x="8398538" y="6792577"/>
             <a:ext cx="421910" cy="184666"/>
           </a:xfrm>
           <a:prstGeom prst="rect">
@@ -5478,7 +5477,7 @@
         </p:nvCxnSpPr>
         <p:spPr>
           <a:xfrm flipH="1">
-            <a:off x="10317587" y="6167655"/>
+            <a:off x="10317587" y="6955055"/>
             <a:ext cx="1215237" cy="123110"/>
           </a:xfrm>
           <a:prstGeom prst="bentConnector4">
@@ -5517,14 +5516,12 @@
           </p:cNvPr>
           <p:cNvCxnSpPr>
             <a:cxnSpLocks/>
-            <a:stCxn id="47" idx="0"/>
-            <a:endCxn id="47" idx="1"/>
           </p:cNvCxnSpPr>
           <p:nvPr/>
         </p:nvCxnSpPr>
         <p:spPr>
           <a:xfrm rot="16200000" flipH="1" flipV="1">
-            <a:off x="8143255" y="1541582"/>
+            <a:off x="8143255" y="1224082"/>
             <a:ext cx="123111" cy="1030090"/>
           </a:xfrm>
           <a:prstGeom prst="bentConnector4">
@@ -5566,7 +5563,7 @@
         </p:nvSpPr>
         <p:spPr>
           <a:xfrm>
-            <a:off x="7498359" y="5059970"/>
+            <a:off x="7498359" y="5847370"/>
             <a:ext cx="2515433" cy="246221"/>
           </a:xfrm>
           <a:prstGeom prst="rect">
@@ -5600,15 +5597,15 @@
           </p:cNvPr>
           <p:cNvCxnSpPr>
             <a:cxnSpLocks/>
-            <a:stCxn id="100" idx="2"/>
+            <a:stCxn id="47" idx="2"/>
             <a:endCxn id="66" idx="0"/>
           </p:cNvCxnSpPr>
           <p:nvPr/>
         </p:nvCxnSpPr>
         <p:spPr>
-          <a:xfrm flipH="1">
-            <a:off x="8756076" y="3369053"/>
-            <a:ext cx="3720440" cy="1690917"/>
+          <a:xfrm>
+            <a:off x="8719856" y="3028693"/>
+            <a:ext cx="36220" cy="2818677"/>
           </a:xfrm>
           <a:prstGeom prst="straightConnector1">
             <a:avLst/>
@@ -5646,7 +5643,7 @@
         </p:nvSpPr>
         <p:spPr>
           <a:xfrm>
-            <a:off x="10337106" y="5188170"/>
+            <a:off x="10337106" y="5975570"/>
             <a:ext cx="445956" cy="184666"/>
           </a:xfrm>
           <a:prstGeom prst="rect">
@@ -5682,7 +5679,7 @@
         </p:nvSpPr>
         <p:spPr>
           <a:xfrm>
-            <a:off x="10595133" y="5533999"/>
+            <a:off x="10595133" y="6321399"/>
             <a:ext cx="2871300" cy="246221"/>
           </a:xfrm>
           <a:prstGeom prst="rect">
@@ -5722,7 +5719,7 @@
         </p:nvCxnSpPr>
         <p:spPr>
           <a:xfrm>
-            <a:off x="10013792" y="5183081"/>
+            <a:off x="10013792" y="5970481"/>
             <a:ext cx="985614" cy="379511"/>
           </a:xfrm>
           <a:prstGeom prst="straightConnector1">
@@ -5764,7 +5761,7 @@
         </p:nvCxnSpPr>
         <p:spPr>
           <a:xfrm>
-            <a:off x="8719856" y="2241293"/>
+            <a:off x="8719856" y="3028693"/>
             <a:ext cx="2821459" cy="3292706"/>
           </a:xfrm>
           <a:prstGeom prst="straightConnector1">
@@ -5807,7 +5804,7 @@
         </p:nvCxnSpPr>
         <p:spPr>
           <a:xfrm flipH="1" flipV="1">
-            <a:off x="12030783" y="5533999"/>
+            <a:off x="12030783" y="6321399"/>
             <a:ext cx="1435650" cy="123111"/>
           </a:xfrm>
           <a:prstGeom prst="bentConnector4">
@@ -5849,7 +5846,7 @@
         </p:nvSpPr>
         <p:spPr>
           <a:xfrm>
-            <a:off x="12664610" y="5124812"/>
+            <a:off x="12664610" y="5912212"/>
             <a:ext cx="405880" cy="184666"/>
           </a:xfrm>
           <a:prstGeom prst="rect">
@@ -5885,7 +5882,7 @@
         </p:nvSpPr>
         <p:spPr>
           <a:xfrm>
-            <a:off x="14061700" y="5533999"/>
+            <a:off x="14061700" y="6321399"/>
             <a:ext cx="2432076" cy="246221"/>
           </a:xfrm>
           <a:prstGeom prst="rect">
@@ -5924,7 +5921,7 @@
         </p:nvCxnSpPr>
         <p:spPr>
           <a:xfrm>
-            <a:off x="13466433" y="5657110"/>
+            <a:off x="13466433" y="6444510"/>
             <a:ext cx="595267" cy="0"/>
           </a:xfrm>
           <a:prstGeom prst="straightConnector1">
@@ -5963,7 +5960,7 @@
         </p:nvSpPr>
         <p:spPr>
           <a:xfrm>
-            <a:off x="13615744" y="5470259"/>
+            <a:off x="13615744" y="6257659"/>
             <a:ext cx="429926" cy="184666"/>
           </a:xfrm>
           <a:prstGeom prst="rect">
@@ -6006,7 +6003,7 @@
         </p:nvCxnSpPr>
         <p:spPr>
           <a:xfrm flipH="1">
-            <a:off x="15277738" y="5657110"/>
+            <a:off x="15277738" y="6444510"/>
             <a:ext cx="1216038" cy="123110"/>
           </a:xfrm>
           <a:prstGeom prst="bentConnector4">
@@ -6048,7 +6045,7 @@
         </p:nvSpPr>
         <p:spPr>
           <a:xfrm>
-            <a:off x="15850305" y="5847178"/>
+            <a:off x="15850305" y="6634578"/>
             <a:ext cx="404278" cy="184666"/>
           </a:xfrm>
           <a:prstGeom prst="rect">
@@ -6080,6 +6077,7 @@
             </a:extLst>
           </p:cNvPr>
           <p:cNvCxnSpPr>
+            <a:cxnSpLocks/>
             <a:stCxn id="47" idx="2"/>
             <a:endCxn id="92" idx="0"/>
           </p:cNvCxnSpPr>
@@ -6087,7 +6085,7 @@
         </p:nvCxnSpPr>
         <p:spPr>
           <a:xfrm>
-            <a:off x="8719856" y="2241293"/>
+            <a:off x="8719856" y="3028693"/>
             <a:ext cx="6557882" cy="3292706"/>
           </a:xfrm>
           <a:prstGeom prst="straightConnector1">
@@ -6126,7 +6124,7 @@
         </p:nvSpPr>
         <p:spPr>
           <a:xfrm>
-            <a:off x="5345303" y="4116679"/>
+            <a:off x="5345303" y="4904079"/>
             <a:ext cx="2733441" cy="246221"/>
           </a:xfrm>
           <a:prstGeom prst="rect">
@@ -6163,7 +6161,7 @@
         </p:nvSpPr>
         <p:spPr>
           <a:xfrm>
-            <a:off x="5760453" y="3683848"/>
+            <a:off x="5760453" y="4471248"/>
             <a:ext cx="405880" cy="184666"/>
           </a:xfrm>
           <a:prstGeom prst="rect">
@@ -6199,7 +6197,7 @@
         </p:nvSpPr>
         <p:spPr>
           <a:xfrm>
-            <a:off x="4793240" y="3037179"/>
+            <a:off x="4793240" y="3824579"/>
             <a:ext cx="2294218" cy="246221"/>
           </a:xfrm>
           <a:prstGeom prst="rect">
@@ -6239,7 +6237,7 @@
         </p:nvCxnSpPr>
         <p:spPr>
           <a:xfrm rot="10800000" flipH="1">
-            <a:off x="4793239" y="3037180"/>
+            <a:off x="4793239" y="3824580"/>
             <a:ext cx="1147109" cy="123111"/>
           </a:xfrm>
           <a:prstGeom prst="bentConnector4">
@@ -6281,7 +6279,7 @@
         </p:nvSpPr>
         <p:spPr>
           <a:xfrm>
-            <a:off x="4987146" y="2610411"/>
+            <a:off x="4987146" y="3397811"/>
             <a:ext cx="404278" cy="184666"/>
           </a:xfrm>
           <a:prstGeom prst="rect">
@@ -6319,7 +6317,7 @@
         </p:nvCxnSpPr>
         <p:spPr>
           <a:xfrm flipV="1">
-            <a:off x="8078744" y="2241293"/>
+            <a:off x="8078744" y="3028693"/>
             <a:ext cx="530749" cy="1998497"/>
           </a:xfrm>
           <a:prstGeom prst="straightConnector1">
@@ -6360,7 +6358,7 @@
         </p:nvCxnSpPr>
         <p:spPr>
           <a:xfrm flipV="1">
-            <a:off x="7087458" y="2241293"/>
+            <a:off x="7087458" y="3028693"/>
             <a:ext cx="1446942" cy="918997"/>
           </a:xfrm>
           <a:prstGeom prst="straightConnector1">
@@ -6402,7 +6400,7 @@
         </p:nvCxnSpPr>
         <p:spPr>
           <a:xfrm rot="16200000" flipH="1" flipV="1">
-            <a:off x="5967108" y="3494873"/>
+            <a:off x="5967108" y="4282273"/>
             <a:ext cx="123111" cy="1366721"/>
           </a:xfrm>
           <a:prstGeom prst="bentConnector4">
@@ -6447,7 +6445,7 @@
         </p:nvCxnSpPr>
         <p:spPr>
           <a:xfrm flipH="1" flipV="1">
-            <a:off x="6712023" y="3330191"/>
+            <a:off x="6712023" y="4117591"/>
             <a:ext cx="1" cy="786488"/>
           </a:xfrm>
           <a:prstGeom prst="straightConnector1">
@@ -6486,7 +6484,7 @@
         </p:nvSpPr>
         <p:spPr>
           <a:xfrm>
-            <a:off x="7898827" y="3392265"/>
+            <a:off x="7898827" y="4179665"/>
             <a:ext cx="405880" cy="184666"/>
           </a:xfrm>
           <a:prstGeom prst="rect">
@@ -6526,7 +6524,7 @@
         </p:nvSpPr>
         <p:spPr>
           <a:xfrm>
-            <a:off x="7192444" y="2613485"/>
+            <a:off x="7192444" y="3400885"/>
             <a:ext cx="405880" cy="184666"/>
           </a:xfrm>
           <a:prstGeom prst="rect">
@@ -6569,7 +6567,7 @@
         </p:nvCxnSpPr>
         <p:spPr>
           <a:xfrm flipV="1">
-            <a:off x="4868954" y="4239790"/>
+            <a:off x="4868954" y="5027190"/>
             <a:ext cx="476349" cy="373223"/>
           </a:xfrm>
           <a:prstGeom prst="straightConnector1">
@@ -6608,7 +6606,7 @@
         </p:nvSpPr>
         <p:spPr>
           <a:xfrm>
-            <a:off x="4743329" y="4263385"/>
+            <a:off x="4743329" y="5050785"/>
             <a:ext cx="445956" cy="184666"/>
           </a:xfrm>
           <a:prstGeom prst="rect">
@@ -6647,7 +6645,7 @@
         </p:nvCxnSpPr>
         <p:spPr>
           <a:xfrm flipH="1" flipV="1">
-            <a:off x="5345303" y="4239790"/>
+            <a:off x="5345303" y="5027190"/>
             <a:ext cx="442731" cy="818839"/>
           </a:xfrm>
           <a:prstGeom prst="straightConnector1">
@@ -6686,7 +6684,7 @@
         </p:nvSpPr>
         <p:spPr>
           <a:xfrm>
-            <a:off x="5581095" y="4603713"/>
+            <a:off x="5581095" y="5391113"/>
             <a:ext cx="445956" cy="184666"/>
           </a:xfrm>
           <a:prstGeom prst="rect">
@@ -6722,7 +6720,7 @@
         </p:nvSpPr>
         <p:spPr>
           <a:xfrm>
-            <a:off x="6337462" y="3462621"/>
+            <a:off x="6337462" y="4250021"/>
             <a:ext cx="429926" cy="184666"/>
           </a:xfrm>
           <a:prstGeom prst="rect">
@@ -6750,10 +6748,10 @@
       </p:sp>
       <p:sp>
         <p:nvSpPr>
-          <p:cNvPr id="97" name="CuadroTexto 96">
-            <a:extLst>
-              <a:ext uri="{FF2B5EF4-FFF2-40B4-BE49-F238E27FC236}">
-                <a16:creationId xmlns:a16="http://schemas.microsoft.com/office/drawing/2014/main" id="{AD7B8123-2CE9-44DA-9BA9-F0FA52585B1D}"/>
+          <p:cNvPr id="119" name="CuadroTexto 118">
+            <a:extLst>
+              <a:ext uri="{FF2B5EF4-FFF2-40B4-BE49-F238E27FC236}">
+                <a16:creationId xmlns:a16="http://schemas.microsoft.com/office/drawing/2014/main" id="{801C6E6A-A6BC-344F-9F56-D489BDB5CEC8}"/>
               </a:ext>
             </a:extLst>
           </p:cNvPr>
@@ -6762,8 +6760,8 @@
         </p:nvSpPr>
         <p:spPr>
           <a:xfrm>
-            <a:off x="12559626" y="2224046"/>
-            <a:ext cx="1954381" cy="246221"/>
+            <a:off x="7667133" y="1677571"/>
+            <a:ext cx="2060179" cy="246221"/>
           </a:xfrm>
           <a:prstGeom prst="rect">
             <a:avLst/>
@@ -6776,9 +6774,10 @@
           </a:bodyPr>
           <a:lstStyle/>
           <a:p>
+            <a:pPr algn="ctr"/>
             <a:r>
               <a:rPr lang="es-ES_tradnl" sz="1000" dirty="0" err="1"/>
-              <a:t>ExecutableSelectWithoutGroupBy</a:t>
+              <a:t>OrderByExecutableSelectExpression</a:t>
             </a:r>
             <a:endParaRPr lang="es-ES_tradnl" sz="1000" dirty="0"/>
           </a:p>
@@ -6786,22 +6785,24 @@
       </p:sp>
       <p:cxnSp>
         <p:nvCxnSpPr>
-          <p:cNvPr id="3" name="Conector recto de flecha 2">
-            <a:extLst>
-              <a:ext uri="{FF2B5EF4-FFF2-40B4-BE49-F238E27FC236}">
-                <a16:creationId xmlns:a16="http://schemas.microsoft.com/office/drawing/2014/main" id="{DE4AD932-33A8-4822-A032-3D3A1C63D68A}"/>
+          <p:cNvPr id="120" name="Conector recto de flecha 119">
+            <a:extLst>
+              <a:ext uri="{FF2B5EF4-FFF2-40B4-BE49-F238E27FC236}">
+                <a16:creationId xmlns:a16="http://schemas.microsoft.com/office/drawing/2014/main" id="{6B471271-808F-0E4C-890A-420E66C7BFFE}"/>
               </a:ext>
             </a:extLst>
           </p:cNvPr>
           <p:cNvCxnSpPr>
-            <a:endCxn id="97" idx="0"/>
+            <a:cxnSpLocks/>
+            <a:stCxn id="119" idx="2"/>
+            <a:endCxn id="47" idx="0"/>
           </p:cNvCxnSpPr>
           <p:nvPr/>
         </p:nvCxnSpPr>
         <p:spPr>
           <a:xfrm>
-            <a:off x="10317587" y="1322904"/>
-            <a:ext cx="3219230" cy="901142"/>
+            <a:off x="8697223" y="1923792"/>
+            <a:ext cx="22633" cy="858680"/>
           </a:xfrm>
           <a:prstGeom prst="straightConnector1">
             <a:avLst/>
@@ -6827,10 +6828,10 @@
       </p:cxnSp>
       <p:sp>
         <p:nvSpPr>
-          <p:cNvPr id="100" name="CuadroTexto 99">
-            <a:extLst>
-              <a:ext uri="{FF2B5EF4-FFF2-40B4-BE49-F238E27FC236}">
-                <a16:creationId xmlns:a16="http://schemas.microsoft.com/office/drawing/2014/main" id="{5F2238E2-B489-4E43-83BE-42E1FB3279CA}"/>
+          <p:cNvPr id="121" name="CuadroTexto 120">
+            <a:extLst>
+              <a:ext uri="{FF2B5EF4-FFF2-40B4-BE49-F238E27FC236}">
+                <a16:creationId xmlns:a16="http://schemas.microsoft.com/office/drawing/2014/main" id="{6ED72A3D-7756-E742-9806-80A313A52D1F}"/>
               </a:ext>
             </a:extLst>
           </p:cNvPr>
@@ -6839,8 +6840,8 @@
         </p:nvSpPr>
         <p:spPr>
           <a:xfrm>
-            <a:off x="11003196" y="3122832"/>
-            <a:ext cx="2946640" cy="246221"/>
+            <a:off x="11254590" y="2767403"/>
+            <a:ext cx="2422459" cy="246221"/>
           </a:xfrm>
           <a:prstGeom prst="rect">
             <a:avLst/>
@@ -6856,83 +6857,7 @@
             <a:pPr algn="ctr"/>
             <a:r>
               <a:rPr lang="es-ES_tradnl" sz="1000" dirty="0" err="1"/>
-              <a:t>OrderByExecutableSelectExpressionWithoutGroupBy</a:t>
-            </a:r>
-            <a:endParaRPr lang="es-ES_tradnl" sz="1000" dirty="0"/>
-          </a:p>
-        </p:txBody>
-      </p:sp>
-      <p:sp>
-        <p:nvSpPr>
-          <p:cNvPr id="102" name="CuadroTexto 101">
-            <a:extLst>
-              <a:ext uri="{FF2B5EF4-FFF2-40B4-BE49-F238E27FC236}">
-                <a16:creationId xmlns:a16="http://schemas.microsoft.com/office/drawing/2014/main" id="{6EAE59F1-D379-48D7-AB6C-EE37E139DA77}"/>
-              </a:ext>
-            </a:extLst>
-          </p:cNvPr>
-          <p:cNvSpPr txBox="1"/>
-          <p:nvPr/>
-        </p:nvSpPr>
-        <p:spPr>
-          <a:xfrm>
-            <a:off x="11845402" y="2713029"/>
-            <a:ext cx="473206" cy="184666"/>
-          </a:xfrm>
-          <a:prstGeom prst="rect">
-            <a:avLst/>
-          </a:prstGeom>
-          <a:noFill/>
-        </p:spPr>
-        <p:txBody>
-          <a:bodyPr wrap="none" rtlCol="0">
-            <a:spAutoFit/>
-          </a:bodyPr>
-          <a:lstStyle/>
-          <a:p>
-            <a:r>
-              <a:rPr lang="es-ES_tradnl" sz="600" dirty="0" err="1"/>
-              <a:t>orderBy</a:t>
-            </a:r>
-            <a:r>
-              <a:rPr lang="es-ES_tradnl" sz="600" dirty="0"/>
-              <a:t>*</a:t>
-            </a:r>
-            <a:endParaRPr lang="es-ES" sz="600" dirty="0"/>
-          </a:p>
-        </p:txBody>
-      </p:sp>
-      <p:sp>
-        <p:nvSpPr>
-          <p:cNvPr id="104" name="CuadroTexto 103">
-            <a:extLst>
-              <a:ext uri="{FF2B5EF4-FFF2-40B4-BE49-F238E27FC236}">
-                <a16:creationId xmlns:a16="http://schemas.microsoft.com/office/drawing/2014/main" id="{44A47B2C-B3AA-4BAB-AD27-1BCE1D1AD4FE}"/>
-              </a:ext>
-            </a:extLst>
-          </p:cNvPr>
-          <p:cNvSpPr txBox="1"/>
-          <p:nvPr/>
-        </p:nvSpPr>
-        <p:spPr>
-          <a:xfrm>
-            <a:off x="14193892" y="3122832"/>
-            <a:ext cx="2901756" cy="246221"/>
-          </a:xfrm>
-          <a:prstGeom prst="rect">
-            <a:avLst/>
-          </a:prstGeom>
-          <a:noFill/>
-        </p:spPr>
-        <p:txBody>
-          <a:bodyPr wrap="none" rtlCol="0">
-            <a:spAutoFit/>
-          </a:bodyPr>
-          <a:lstStyle/>
-          <a:p>
-            <a:r>
-              <a:rPr lang="es-ES_tradnl" sz="1000" dirty="0" err="1"/>
-              <a:t>OffsetExecutableSelectExpressionWithoutGroupBy</a:t>
+              <a:t>CompoundedExecutableSelectExpression</a:t>
             </a:r>
             <a:endParaRPr lang="es-ES_tradnl" sz="1000" dirty="0"/>
           </a:p>
@@ -6940,27 +6865,28 @@
       </p:sp>
       <p:cxnSp>
         <p:nvCxnSpPr>
-          <p:cNvPr id="110" name="Conector recto de flecha 109">
-            <a:extLst>
-              <a:ext uri="{FF2B5EF4-FFF2-40B4-BE49-F238E27FC236}">
-                <a16:creationId xmlns:a16="http://schemas.microsoft.com/office/drawing/2014/main" id="{93ADD49B-D375-40B5-8F6D-1DF7F2796C8E}"/>
+          <p:cNvPr id="122" name="Conector recto de flecha 32">
+            <a:extLst>
+              <a:ext uri="{FF2B5EF4-FFF2-40B4-BE49-F238E27FC236}">
+                <a16:creationId xmlns:a16="http://schemas.microsoft.com/office/drawing/2014/main" id="{4B6D102A-A38D-EB42-A84A-1DE052435C50}"/>
               </a:ext>
             </a:extLst>
           </p:cNvPr>
           <p:cNvCxnSpPr>
             <a:cxnSpLocks/>
-            <a:stCxn id="100" idx="3"/>
-            <a:endCxn id="104" idx="1"/>
           </p:cNvCxnSpPr>
           <p:nvPr/>
         </p:nvCxnSpPr>
         <p:spPr>
-          <a:xfrm>
-            <a:off x="13949836" y="3245943"/>
-            <a:ext cx="244056" cy="0"/>
-          </a:xfrm>
-          <a:prstGeom prst="straightConnector1">
-            <a:avLst/>
+          <a:xfrm flipH="1" flipV="1">
+            <a:off x="12149516" y="2776910"/>
+            <a:ext cx="1435650" cy="123111"/>
+          </a:xfrm>
+          <a:prstGeom prst="bentConnector4">
+            <a:avLst>
+              <a:gd name="adj1" fmla="val -15923"/>
+              <a:gd name="adj2" fmla="val 285686"/>
+            </a:avLst>
           </a:prstGeom>
           <a:ln>
             <a:tailEnd type="triangle"/>
@@ -6981,138 +6907,25 @@
           </a:fontRef>
         </p:style>
       </p:cxnSp>
-      <p:sp>
-        <p:nvSpPr>
-          <p:cNvPr id="111" name="CuadroTexto 110">
-            <a:extLst>
-              <a:ext uri="{FF2B5EF4-FFF2-40B4-BE49-F238E27FC236}">
-                <a16:creationId xmlns:a16="http://schemas.microsoft.com/office/drawing/2014/main" id="{FAD3C976-6774-47F8-A881-5B55E7BBC9DF}"/>
-              </a:ext>
-            </a:extLst>
-          </p:cNvPr>
-          <p:cNvSpPr txBox="1"/>
-          <p:nvPr/>
-        </p:nvSpPr>
-        <p:spPr>
-          <a:xfrm>
-            <a:off x="13869764" y="3063952"/>
-            <a:ext cx="324128" cy="184666"/>
-          </a:xfrm>
-          <a:prstGeom prst="rect">
-            <a:avLst/>
-          </a:prstGeom>
-          <a:noFill/>
-        </p:spPr>
-        <p:txBody>
-          <a:bodyPr wrap="none" rtlCol="0">
-            <a:spAutoFit/>
-          </a:bodyPr>
-          <a:lstStyle/>
-          <a:p>
-            <a:r>
-              <a:rPr lang="es-ES_tradnl" sz="600" dirty="0" err="1"/>
-              <a:t>limit</a:t>
-            </a:r>
-            <a:endParaRPr lang="es-ES" sz="600" dirty="0"/>
-          </a:p>
-        </p:txBody>
-      </p:sp>
       <p:cxnSp>
         <p:nvCxnSpPr>
-          <p:cNvPr id="112" name="Conector recto de flecha 111">
-            <a:extLst>
-              <a:ext uri="{FF2B5EF4-FFF2-40B4-BE49-F238E27FC236}">
-                <a16:creationId xmlns:a16="http://schemas.microsoft.com/office/drawing/2014/main" id="{52768F69-0F11-44CB-AC93-F93D69B46124}"/>
+          <p:cNvPr id="124" name="Conector recto de flecha 123">
+            <a:extLst>
+              <a:ext uri="{FF2B5EF4-FFF2-40B4-BE49-F238E27FC236}">
+                <a16:creationId xmlns:a16="http://schemas.microsoft.com/office/drawing/2014/main" id="{12AFE6F5-D9F2-1540-B61A-427F09B188AD}"/>
               </a:ext>
             </a:extLst>
           </p:cNvPr>
           <p:cNvCxnSpPr>
             <a:cxnSpLocks/>
-            <a:stCxn id="104" idx="0"/>
+            <a:stCxn id="119" idx="2"/>
           </p:cNvCxnSpPr>
           <p:nvPr/>
         </p:nvCxnSpPr>
         <p:spPr>
-          <a:xfrm flipH="1" flipV="1">
-            <a:off x="14085383" y="2450666"/>
-            <a:ext cx="1559387" cy="672166"/>
-          </a:xfrm>
-          <a:prstGeom prst="straightConnector1">
-            <a:avLst/>
-          </a:prstGeom>
-          <a:ln>
-            <a:tailEnd type="triangle"/>
-          </a:ln>
-        </p:spPr>
-        <p:style>
-          <a:lnRef idx="1">
-            <a:schemeClr val="accent1"/>
-          </a:lnRef>
-          <a:fillRef idx="0">
-            <a:schemeClr val="accent1"/>
-          </a:fillRef>
-          <a:effectRef idx="0">
-            <a:schemeClr val="accent1"/>
-          </a:effectRef>
-          <a:fontRef idx="minor">
-            <a:schemeClr val="tx1"/>
-          </a:fontRef>
-        </p:style>
-      </p:cxnSp>
-      <p:sp>
-        <p:nvSpPr>
-          <p:cNvPr id="113" name="CuadroTexto 112">
-            <a:extLst>
-              <a:ext uri="{FF2B5EF4-FFF2-40B4-BE49-F238E27FC236}">
-                <a16:creationId xmlns:a16="http://schemas.microsoft.com/office/drawing/2014/main" id="{DE4C271D-8D0A-4EEA-B5DD-C10F078737EC}"/>
-              </a:ext>
-            </a:extLst>
-          </p:cNvPr>
-          <p:cNvSpPr txBox="1"/>
-          <p:nvPr/>
-        </p:nvSpPr>
-        <p:spPr>
-          <a:xfrm>
-            <a:off x="14547747" y="2710608"/>
-            <a:ext cx="367408" cy="184666"/>
-          </a:xfrm>
-          <a:prstGeom prst="rect">
-            <a:avLst/>
-          </a:prstGeom>
-          <a:noFill/>
-        </p:spPr>
-        <p:txBody>
-          <a:bodyPr wrap="none" rtlCol="0">
-            <a:spAutoFit/>
-          </a:bodyPr>
-          <a:lstStyle/>
-          <a:p>
-            <a:r>
-              <a:rPr lang="es-ES_tradnl" sz="600" dirty="0"/>
-              <a:t>offset</a:t>
-            </a:r>
-            <a:endParaRPr lang="es-ES" sz="600" dirty="0"/>
-          </a:p>
-        </p:txBody>
-      </p:sp>
-      <p:cxnSp>
-        <p:nvCxnSpPr>
-          <p:cNvPr id="114" name="Conector recto de flecha 113">
-            <a:extLst>
-              <a:ext uri="{FF2B5EF4-FFF2-40B4-BE49-F238E27FC236}">
-                <a16:creationId xmlns:a16="http://schemas.microsoft.com/office/drawing/2014/main" id="{79563828-160E-4E9F-BD55-754267D06C32}"/>
-              </a:ext>
-            </a:extLst>
-          </p:cNvPr>
-          <p:cNvCxnSpPr>
-            <a:cxnSpLocks/>
-          </p:cNvCxnSpPr>
-          <p:nvPr/>
-        </p:nvCxnSpPr>
-        <p:spPr>
-          <a:xfrm flipH="1">
-            <a:off x="12950443" y="2464971"/>
-            <a:ext cx="670689" cy="653844"/>
+          <a:xfrm>
+            <a:off x="8697223" y="1923792"/>
+            <a:ext cx="3024877" cy="795276"/>
           </a:xfrm>
           <a:prstGeom prst="straightConnector1">
             <a:avLst/>
@@ -7138,20 +6951,23 @@
       </p:cxnSp>
       <p:cxnSp>
         <p:nvCxnSpPr>
-          <p:cNvPr id="115" name="Conector recto de flecha 114">
-            <a:extLst>
-              <a:ext uri="{FF2B5EF4-FFF2-40B4-BE49-F238E27FC236}">
-                <a16:creationId xmlns:a16="http://schemas.microsoft.com/office/drawing/2014/main" id="{17B238A3-6BFD-48A0-A26A-D002F2B43266}"/>
-              </a:ext>
-            </a:extLst>
-          </p:cNvPr>
-          <p:cNvCxnSpPr/>
+          <p:cNvPr id="127" name="Conector recto de flecha 126">
+            <a:extLst>
+              <a:ext uri="{FF2B5EF4-FFF2-40B4-BE49-F238E27FC236}">
+                <a16:creationId xmlns:a16="http://schemas.microsoft.com/office/drawing/2014/main" id="{9F0CEA55-2FC6-0E41-BB0F-AFAD1B0BF305}"/>
+              </a:ext>
+            </a:extLst>
+          </p:cNvPr>
+          <p:cNvCxnSpPr>
+            <a:cxnSpLocks/>
+            <a:endCxn id="121" idx="1"/>
+          </p:cNvCxnSpPr>
           <p:nvPr/>
         </p:nvCxnSpPr>
         <p:spPr>
-          <a:xfrm>
-            <a:off x="13621132" y="2464971"/>
-            <a:ext cx="802095" cy="606380"/>
+          <a:xfrm flipV="1">
+            <a:off x="9884114" y="2890514"/>
+            <a:ext cx="1370476" cy="9508"/>
           </a:xfrm>
           <a:prstGeom prst="straightConnector1">
             <a:avLst/>
@@ -7161,114 +6977,26 @@
           </a:ln>
         </p:spPr>
         <p:style>
-          <a:lnRef idx="3">
-            <a:schemeClr val="accent2"/>
+          <a:lnRef idx="1">
+            <a:schemeClr val="accent1"/>
           </a:lnRef>
           <a:fillRef idx="0">
-            <a:schemeClr val="accent2"/>
+            <a:schemeClr val="accent1"/>
           </a:fillRef>
-          <a:effectRef idx="2">
-            <a:schemeClr val="accent2"/>
+          <a:effectRef idx="0">
+            <a:schemeClr val="accent1"/>
           </a:effectRef>
           <a:fontRef idx="minor">
             <a:schemeClr val="tx1"/>
           </a:fontRef>
         </p:style>
       </p:cxnSp>
-      <p:cxnSp>
-        <p:nvCxnSpPr>
-          <p:cNvPr id="116" name="Conector recto de flecha 200">
-            <a:extLst>
-              <a:ext uri="{FF2B5EF4-FFF2-40B4-BE49-F238E27FC236}">
-                <a16:creationId xmlns:a16="http://schemas.microsoft.com/office/drawing/2014/main" id="{18EC108F-A8D0-4852-B21A-77353DBA19E0}"/>
-              </a:ext>
-            </a:extLst>
-          </p:cNvPr>
-          <p:cNvCxnSpPr>
-            <a:cxnSpLocks/>
-            <a:stCxn id="100" idx="0"/>
-            <a:endCxn id="100" idx="1"/>
-          </p:cNvCxnSpPr>
-          <p:nvPr/>
-        </p:nvCxnSpPr>
-        <p:spPr>
-          <a:xfrm rot="16200000" flipH="1" flipV="1">
-            <a:off x="11678300" y="2447727"/>
-            <a:ext cx="123111" cy="1473320"/>
-          </a:xfrm>
-          <a:prstGeom prst="bentConnector4">
-            <a:avLst>
-              <a:gd name="adj1" fmla="val -185686"/>
-              <a:gd name="adj2" fmla="val 108275"/>
-            </a:avLst>
-          </a:prstGeom>
-          <a:ln>
-            <a:tailEnd type="triangle"/>
-          </a:ln>
-        </p:spPr>
-        <p:style>
-          <a:lnRef idx="1">
-            <a:schemeClr val="accent1"/>
-          </a:lnRef>
-          <a:fillRef idx="0">
-            <a:schemeClr val="accent1"/>
-          </a:fillRef>
-          <a:effectRef idx="0">
-            <a:schemeClr val="accent1"/>
-          </a:effectRef>
-          <a:fontRef idx="minor">
-            <a:schemeClr val="tx1"/>
-          </a:fontRef>
-        </p:style>
-      </p:cxnSp>
-      <p:cxnSp>
-        <p:nvCxnSpPr>
-          <p:cNvPr id="117" name="Conector recto de flecha 116">
-            <a:extLst>
-              <a:ext uri="{FF2B5EF4-FFF2-40B4-BE49-F238E27FC236}">
-                <a16:creationId xmlns:a16="http://schemas.microsoft.com/office/drawing/2014/main" id="{2F7702AF-95CF-4DBC-B144-722A4C2E7A99}"/>
-              </a:ext>
-            </a:extLst>
-          </p:cNvPr>
-          <p:cNvCxnSpPr>
-            <a:cxnSpLocks/>
-            <a:endCxn id="67" idx="5"/>
-          </p:cNvCxnSpPr>
-          <p:nvPr/>
-        </p:nvCxnSpPr>
-        <p:spPr>
-          <a:xfrm flipH="1" flipV="1">
-            <a:off x="12125076" y="1286846"/>
-            <a:ext cx="1592450" cy="890406"/>
-          </a:xfrm>
-          <a:prstGeom prst="straightConnector1">
-            <a:avLst/>
-          </a:prstGeom>
-          <a:ln>
-            <a:tailEnd type="triangle"/>
-          </a:ln>
-        </p:spPr>
-        <p:style>
-          <a:lnRef idx="1">
-            <a:schemeClr val="accent1"/>
-          </a:lnRef>
-          <a:fillRef idx="0">
-            <a:schemeClr val="accent1"/>
-          </a:fillRef>
-          <a:effectRef idx="0">
-            <a:schemeClr val="accent1"/>
-          </a:effectRef>
-          <a:fontRef idx="minor">
-            <a:schemeClr val="tx1"/>
-          </a:fontRef>
-        </p:style>
-      </p:cxnSp>
-      <p:sp>
-        <p:nvSpPr>
-          <p:cNvPr id="118" name="CuadroTexto 117">
-            <a:extLst>
-              <a:ext uri="{FF2B5EF4-FFF2-40B4-BE49-F238E27FC236}">
-                <a16:creationId xmlns:a16="http://schemas.microsoft.com/office/drawing/2014/main" id="{CEF7BF89-B745-4F22-AEA4-3C8C1A589AE7}"/>
+      <p:sp>
+        <p:nvSpPr>
+          <p:cNvPr id="129" name="CuadroTexto 128">
+            <a:extLst>
+              <a:ext uri="{FF2B5EF4-FFF2-40B4-BE49-F238E27FC236}">
+                <a16:creationId xmlns:a16="http://schemas.microsoft.com/office/drawing/2014/main" id="{FFC1E540-BB97-1B42-88B6-143BA7B01343}"/>
               </a:ext>
             </a:extLst>
           </p:cNvPr>
@@ -7277,8 +7005,8 @@
         </p:nvSpPr>
         <p:spPr>
           <a:xfrm>
-            <a:off x="12875697" y="1582848"/>
-            <a:ext cx="771365" cy="184666"/>
+            <a:off x="10167902" y="2677658"/>
+            <a:ext cx="486030" cy="184666"/>
           </a:xfrm>
           <a:prstGeom prst="rect">
             <a:avLst/>
@@ -7293,7 +7021,51 @@
           <a:p>
             <a:r>
               <a:rPr lang="es-ES_tradnl" sz="600" dirty="0" err="1"/>
-              <a:t>executeSelectPage</a:t>
+              <a:t>union</a:t>
+            </a:r>
+            <a:r>
+              <a:rPr lang="es-ES_tradnl" sz="600" dirty="0"/>
+              <a:t> | …</a:t>
+            </a:r>
+            <a:endParaRPr lang="es-ES" sz="600" dirty="0"/>
+          </a:p>
+        </p:txBody>
+      </p:sp>
+      <p:sp>
+        <p:nvSpPr>
+          <p:cNvPr id="130" name="CuadroTexto 129">
+            <a:extLst>
+              <a:ext uri="{FF2B5EF4-FFF2-40B4-BE49-F238E27FC236}">
+                <a16:creationId xmlns:a16="http://schemas.microsoft.com/office/drawing/2014/main" id="{FB52353A-2D19-9748-8BA2-17476E8BB852}"/>
+              </a:ext>
+            </a:extLst>
+          </p:cNvPr>
+          <p:cNvSpPr txBox="1"/>
+          <p:nvPr/>
+        </p:nvSpPr>
+        <p:spPr>
+          <a:xfrm>
+            <a:off x="12827475" y="2362394"/>
+            <a:ext cx="486030" cy="184666"/>
+          </a:xfrm>
+          <a:prstGeom prst="rect">
+            <a:avLst/>
+          </a:prstGeom>
+          <a:noFill/>
+        </p:spPr>
+        <p:txBody>
+          <a:bodyPr wrap="none" rtlCol="0">
+            <a:spAutoFit/>
+          </a:bodyPr>
+          <a:lstStyle/>
+          <a:p>
+            <a:r>
+              <a:rPr lang="es-ES_tradnl" sz="600" dirty="0" err="1"/>
+              <a:t>union</a:t>
+            </a:r>
+            <a:r>
+              <a:rPr lang="es-ES_tradnl" sz="600" dirty="0"/>
+              <a:t> | …</a:t>
             </a:r>
             <a:endParaRPr lang="es-ES" sz="600" dirty="0"/>
           </a:p>

</xml_diff>

<commit_message>
Extends the possibility of a select query to change the shape of the projected object allowing move some property to an internal object (split) or combine the result with a second query string the value as a property of the first one (compose)
</commit_message>
<xml_diff>
--- a/doc/select.pptx
+++ b/doc/select.pptx
@@ -255,7 +255,7 @@
           <a:p>
             <a:fld id="{064700E2-490F-4419-AC2C-49136718AF20}" type="datetimeFigureOut">
               <a:rPr lang="es-ES" smtClean="0"/>
-              <a:t>20/5/21</a:t>
+              <a:t>21/5/21</a:t>
             </a:fld>
             <a:endParaRPr lang="es-ES"/>
           </a:p>
@@ -425,7 +425,7 @@
           <a:p>
             <a:fld id="{064700E2-490F-4419-AC2C-49136718AF20}" type="datetimeFigureOut">
               <a:rPr lang="es-ES" smtClean="0"/>
-              <a:t>20/5/21</a:t>
+              <a:t>21/5/21</a:t>
             </a:fld>
             <a:endParaRPr lang="es-ES"/>
           </a:p>
@@ -605,7 +605,7 @@
           <a:p>
             <a:fld id="{064700E2-490F-4419-AC2C-49136718AF20}" type="datetimeFigureOut">
               <a:rPr lang="es-ES" smtClean="0"/>
-              <a:t>20/5/21</a:t>
+              <a:t>21/5/21</a:t>
             </a:fld>
             <a:endParaRPr lang="es-ES"/>
           </a:p>
@@ -775,7 +775,7 @@
           <a:p>
             <a:fld id="{064700E2-490F-4419-AC2C-49136718AF20}" type="datetimeFigureOut">
               <a:rPr lang="es-ES" smtClean="0"/>
-              <a:t>20/5/21</a:t>
+              <a:t>21/5/21</a:t>
             </a:fld>
             <a:endParaRPr lang="es-ES"/>
           </a:p>
@@ -1021,7 +1021,7 @@
           <a:p>
             <a:fld id="{064700E2-490F-4419-AC2C-49136718AF20}" type="datetimeFigureOut">
               <a:rPr lang="es-ES" smtClean="0"/>
-              <a:t>20/5/21</a:t>
+              <a:t>21/5/21</a:t>
             </a:fld>
             <a:endParaRPr lang="es-ES"/>
           </a:p>
@@ -1253,7 +1253,7 @@
           <a:p>
             <a:fld id="{064700E2-490F-4419-AC2C-49136718AF20}" type="datetimeFigureOut">
               <a:rPr lang="es-ES" smtClean="0"/>
-              <a:t>20/5/21</a:t>
+              <a:t>21/5/21</a:t>
             </a:fld>
             <a:endParaRPr lang="es-ES"/>
           </a:p>
@@ -1620,7 +1620,7 @@
           <a:p>
             <a:fld id="{064700E2-490F-4419-AC2C-49136718AF20}" type="datetimeFigureOut">
               <a:rPr lang="es-ES" smtClean="0"/>
-              <a:t>20/5/21</a:t>
+              <a:t>21/5/21</a:t>
             </a:fld>
             <a:endParaRPr lang="es-ES"/>
           </a:p>
@@ -1738,7 +1738,7 @@
           <a:p>
             <a:fld id="{064700E2-490F-4419-AC2C-49136718AF20}" type="datetimeFigureOut">
               <a:rPr lang="es-ES" smtClean="0"/>
-              <a:t>20/5/21</a:t>
+              <a:t>21/5/21</a:t>
             </a:fld>
             <a:endParaRPr lang="es-ES"/>
           </a:p>
@@ -1833,7 +1833,7 @@
           <a:p>
             <a:fld id="{064700E2-490F-4419-AC2C-49136718AF20}" type="datetimeFigureOut">
               <a:rPr lang="es-ES" smtClean="0"/>
-              <a:t>20/5/21</a:t>
+              <a:t>21/5/21</a:t>
             </a:fld>
             <a:endParaRPr lang="es-ES"/>
           </a:p>
@@ -2110,7 +2110,7 @@
           <a:p>
             <a:fld id="{064700E2-490F-4419-AC2C-49136718AF20}" type="datetimeFigureOut">
               <a:rPr lang="es-ES" smtClean="0"/>
-              <a:t>20/5/21</a:t>
+              <a:t>21/5/21</a:t>
             </a:fld>
             <a:endParaRPr lang="es-ES"/>
           </a:p>
@@ -2367,7 +2367,7 @@
           <a:p>
             <a:fld id="{064700E2-490F-4419-AC2C-49136718AF20}" type="datetimeFigureOut">
               <a:rPr lang="es-ES" smtClean="0"/>
-              <a:t>20/5/21</a:t>
+              <a:t>21/5/21</a:t>
             </a:fld>
             <a:endParaRPr lang="es-ES"/>
           </a:p>
@@ -2580,7 +2580,7 @@
           <a:p>
             <a:fld id="{064700E2-490F-4419-AC2C-49136718AF20}" type="datetimeFigureOut">
               <a:rPr lang="es-ES" smtClean="0"/>
-              <a:t>20/5/21</a:t>
+              <a:t>21/5/21</a:t>
             </a:fld>
             <a:endParaRPr lang="es-ES"/>
           </a:p>
@@ -3743,7 +3743,7 @@
         <p:spPr>
           <a:xfrm>
             <a:off x="9444243" y="759184"/>
-            <a:ext cx="1067921" cy="246221"/>
+            <a:ext cx="1609736" cy="246221"/>
           </a:xfrm>
           <a:prstGeom prst="rect">
             <a:avLst/>
@@ -3758,7 +3758,7 @@
           <a:p>
             <a:r>
               <a:rPr lang="es-ES_tradnl" sz="1000" dirty="0" err="1"/>
-              <a:t>ExecutableSelect</a:t>
+              <a:t>WithdableExecutableSelect</a:t>
             </a:r>
             <a:endParaRPr lang="es-ES_tradnl" sz="1000" dirty="0"/>
           </a:p>
@@ -3778,7 +3778,7 @@
         </p:nvSpPr>
         <p:spPr>
           <a:xfrm>
-            <a:off x="11897433" y="759183"/>
+            <a:off x="11897433" y="86083"/>
             <a:ext cx="266700" cy="246221"/>
           </a:xfrm>
           <a:prstGeom prst="ellipse">
@@ -3824,14 +3824,13 @@
           </p:cNvPr>
           <p:cNvCxnSpPr>
             <a:cxnSpLocks/>
-            <a:stCxn id="65" idx="3"/>
             <a:endCxn id="67" idx="2"/>
           </p:cNvCxnSpPr>
           <p:nvPr/>
         </p:nvCxnSpPr>
         <p:spPr>
           <a:xfrm flipV="1">
-            <a:off x="10512163" y="882294"/>
+            <a:off x="10512163" y="209194"/>
             <a:ext cx="1385270" cy="1"/>
           </a:xfrm>
           <a:prstGeom prst="straightConnector1">
@@ -3988,8 +3987,8 @@
         </p:nvCxnSpPr>
         <p:spPr>
           <a:xfrm flipH="1" flipV="1">
-            <a:off x="9978204" y="1005405"/>
-            <a:ext cx="1080890" cy="672167"/>
+            <a:off x="10249111" y="1005405"/>
+            <a:ext cx="809983" cy="672167"/>
           </a:xfrm>
           <a:prstGeom prst="straightConnector1">
             <a:avLst/>
@@ -4188,7 +4187,7 @@
         </p:nvSpPr>
         <p:spPr>
           <a:xfrm>
-            <a:off x="10529406" y="707407"/>
+            <a:off x="10529406" y="34307"/>
             <a:ext cx="470000" cy="184666"/>
           </a:xfrm>
           <a:prstGeom prst="rect">
@@ -7066,6 +7065,212 @@
             <a:r>
               <a:rPr lang="es-ES_tradnl" sz="600" dirty="0"/>
               <a:t> | …</a:t>
+            </a:r>
+            <a:endParaRPr lang="es-ES" sz="600" dirty="0"/>
+          </a:p>
+        </p:txBody>
+      </p:sp>
+      <p:sp>
+        <p:nvSpPr>
+          <p:cNvPr id="104" name="CuadroTexto 103">
+            <a:extLst>
+              <a:ext uri="{FF2B5EF4-FFF2-40B4-BE49-F238E27FC236}">
+                <a16:creationId xmlns:a16="http://schemas.microsoft.com/office/drawing/2014/main" id="{0B3C48E6-A6A5-A542-A189-AFF2B4F74D04}"/>
+              </a:ext>
+            </a:extLst>
+          </p:cNvPr>
+          <p:cNvSpPr txBox="1"/>
+          <p:nvPr/>
+        </p:nvSpPr>
+        <p:spPr>
+          <a:xfrm>
+            <a:off x="9459991" y="85876"/>
+            <a:ext cx="1067921" cy="246221"/>
+          </a:xfrm>
+          <a:prstGeom prst="rect">
+            <a:avLst/>
+          </a:prstGeom>
+          <a:noFill/>
+        </p:spPr>
+        <p:txBody>
+          <a:bodyPr wrap="none" rtlCol="0">
+            <a:spAutoFit/>
+          </a:bodyPr>
+          <a:lstStyle/>
+          <a:p>
+            <a:r>
+              <a:rPr lang="es-ES_tradnl" sz="1000" dirty="0" err="1"/>
+              <a:t>ExecutableSelect</a:t>
+            </a:r>
+            <a:endParaRPr lang="es-ES_tradnl" sz="1000" dirty="0"/>
+          </a:p>
+        </p:txBody>
+      </p:sp>
+      <p:cxnSp>
+        <p:nvCxnSpPr>
+          <p:cNvPr id="110" name="Conector recto de flecha 109">
+            <a:extLst>
+              <a:ext uri="{FF2B5EF4-FFF2-40B4-BE49-F238E27FC236}">
+                <a16:creationId xmlns:a16="http://schemas.microsoft.com/office/drawing/2014/main" id="{C751E935-F290-AF47-B34A-C493EE4CA8CA}"/>
+              </a:ext>
+            </a:extLst>
+          </p:cNvPr>
+          <p:cNvCxnSpPr>
+            <a:cxnSpLocks/>
+            <a:stCxn id="104" idx="2"/>
+            <a:endCxn id="65" idx="0"/>
+          </p:cNvCxnSpPr>
+          <p:nvPr/>
+        </p:nvCxnSpPr>
+        <p:spPr>
+          <a:xfrm>
+            <a:off x="9993952" y="332097"/>
+            <a:ext cx="255159" cy="427087"/>
+          </a:xfrm>
+          <a:prstGeom prst="straightConnector1">
+            <a:avLst/>
+          </a:prstGeom>
+          <a:ln>
+            <a:tailEnd type="triangle"/>
+          </a:ln>
+        </p:spPr>
+        <p:style>
+          <a:lnRef idx="3">
+            <a:schemeClr val="accent2"/>
+          </a:lnRef>
+          <a:fillRef idx="0">
+            <a:schemeClr val="accent2"/>
+          </a:fillRef>
+          <a:effectRef idx="2">
+            <a:schemeClr val="accent2"/>
+          </a:effectRef>
+          <a:fontRef idx="minor">
+            <a:schemeClr val="tx1"/>
+          </a:fontRef>
+        </p:style>
+      </p:cxnSp>
+      <p:sp>
+        <p:nvSpPr>
+          <p:cNvPr id="111" name="Elipse 110">
+            <a:extLst>
+              <a:ext uri="{FF2B5EF4-FFF2-40B4-BE49-F238E27FC236}">
+                <a16:creationId xmlns:a16="http://schemas.microsoft.com/office/drawing/2014/main" id="{1D79B97B-862C-8B4F-95F7-A39DECFD93DD}"/>
+              </a:ext>
+            </a:extLst>
+          </p:cNvPr>
+          <p:cNvSpPr/>
+          <p:nvPr/>
+        </p:nvSpPr>
+        <p:spPr>
+          <a:xfrm>
+            <a:off x="12405433" y="771883"/>
+            <a:ext cx="266700" cy="246221"/>
+          </a:xfrm>
+          <a:prstGeom prst="ellipse">
+            <a:avLst/>
+          </a:prstGeom>
+        </p:spPr>
+        <p:style>
+          <a:lnRef idx="0">
+            <a:schemeClr val="accent4"/>
+          </a:lnRef>
+          <a:fillRef idx="3">
+            <a:schemeClr val="accent4"/>
+          </a:fillRef>
+          <a:effectRef idx="3">
+            <a:schemeClr val="accent4"/>
+          </a:effectRef>
+          <a:fontRef idx="minor">
+            <a:schemeClr val="lt1"/>
+          </a:fontRef>
+        </p:style>
+        <p:txBody>
+          <a:bodyPr rot="0" spcFirstLastPara="0" vertOverflow="overflow" horzOverflow="overflow" vert="horz" wrap="square" lIns="91440" tIns="45720" rIns="91440" bIns="45720" numCol="1" spcCol="0" rtlCol="0" fromWordArt="0" anchor="ctr" anchorCtr="0" forceAA="0" compatLnSpc="1">
+            <a:prstTxWarp prst="textNoShape">
+              <a:avLst/>
+            </a:prstTxWarp>
+            <a:noAutofit/>
+          </a:bodyPr>
+          <a:lstStyle/>
+          <a:p>
+            <a:pPr algn="ctr"/>
+            <a:endParaRPr lang="es-ES"/>
+          </a:p>
+        </p:txBody>
+      </p:sp>
+      <p:cxnSp>
+        <p:nvCxnSpPr>
+          <p:cNvPr id="112" name="Conector recto de flecha 111">
+            <a:extLst>
+              <a:ext uri="{FF2B5EF4-FFF2-40B4-BE49-F238E27FC236}">
+                <a16:creationId xmlns:a16="http://schemas.microsoft.com/office/drawing/2014/main" id="{C5FCFC5E-3A47-874F-A414-DD16EEA3CC30}"/>
+              </a:ext>
+            </a:extLst>
+          </p:cNvPr>
+          <p:cNvCxnSpPr>
+            <a:cxnSpLocks/>
+            <a:endCxn id="111" idx="2"/>
+          </p:cNvCxnSpPr>
+          <p:nvPr/>
+        </p:nvCxnSpPr>
+        <p:spPr>
+          <a:xfrm flipV="1">
+            <a:off x="11020163" y="894994"/>
+            <a:ext cx="1385270" cy="1"/>
+          </a:xfrm>
+          <a:prstGeom prst="straightConnector1">
+            <a:avLst/>
+          </a:prstGeom>
+          <a:ln>
+            <a:tailEnd type="triangle"/>
+          </a:ln>
+        </p:spPr>
+        <p:style>
+          <a:lnRef idx="1">
+            <a:schemeClr val="accent1"/>
+          </a:lnRef>
+          <a:fillRef idx="0">
+            <a:schemeClr val="accent1"/>
+          </a:fillRef>
+          <a:effectRef idx="0">
+            <a:schemeClr val="accent1"/>
+          </a:effectRef>
+          <a:fontRef idx="minor">
+            <a:schemeClr val="tx1"/>
+          </a:fontRef>
+        </p:style>
+      </p:cxnSp>
+      <p:sp>
+        <p:nvSpPr>
+          <p:cNvPr id="113" name="CuadroTexto 112">
+            <a:extLst>
+              <a:ext uri="{FF2B5EF4-FFF2-40B4-BE49-F238E27FC236}">
+                <a16:creationId xmlns:a16="http://schemas.microsoft.com/office/drawing/2014/main" id="{CAD41235-EDED-C549-8427-C4602CB25D18}"/>
+              </a:ext>
+            </a:extLst>
+          </p:cNvPr>
+          <p:cNvSpPr txBox="1"/>
+          <p:nvPr/>
+        </p:nvSpPr>
+        <p:spPr>
+          <a:xfrm>
+            <a:off x="11037406" y="720107"/>
+            <a:ext cx="721672" cy="184666"/>
+          </a:xfrm>
+          <a:prstGeom prst="rect">
+            <a:avLst/>
+          </a:prstGeom>
+          <a:noFill/>
+        </p:spPr>
+        <p:txBody>
+          <a:bodyPr wrap="none" rtlCol="0">
+            <a:spAutoFit/>
+          </a:bodyPr>
+          <a:lstStyle/>
+          <a:p>
+            <a:r>
+              <a:rPr lang="es-ES" sz="600" dirty="0" err="1"/>
+              <a:t>forUseInQueryAs</a:t>
             </a:r>
             <a:endParaRPr lang="es-ES" sz="600" dirty="0"/>
           </a:p>

</xml_diff>